<commit_message>
Get back original CF templates
</commit_message>
<xml_diff>
--- a/starter/DevOpsPipeline.pptx
+++ b/starter/DevOpsPipeline.pptx
@@ -43,7 +43,7 @@
         <p:txBody>
           <a:bodyPr/>
           <a:p>
-            <a:fld id="{30650E02-C64C-4E26-9E54-BD87AAB1BF96}" type="slidenum">
+            <a:fld id="{381546C4-F0D6-4078-B0DD-4BC90219DB59}" type="slidenum">
               <a:t>&lt;#&gt;</a:t>
             </a:fld>
           </a:p>
@@ -73,7 +73,7 @@
       </p:grpSpPr>
       <p:sp>
         <p:nvSpPr>
-          <p:cNvPr id="23" name="PlaceHolder 1"/>
+          <p:cNvPr id="24" name="PlaceHolder 1"/>
           <p:cNvSpPr>
             <a:spLocks noGrp="1"/>
           </p:cNvSpPr>
@@ -110,7 +110,7 @@
       </p:sp>
       <p:sp>
         <p:nvSpPr>
-          <p:cNvPr id="24" name="PlaceHolder 2"/>
+          <p:cNvPr id="25" name="PlaceHolder 2"/>
           <p:cNvSpPr>
             <a:spLocks noGrp="1"/>
           </p:cNvSpPr>
@@ -147,7 +147,7 @@
       </p:sp>
       <p:sp>
         <p:nvSpPr>
-          <p:cNvPr id="25" name="PlaceHolder 3"/>
+          <p:cNvPr id="26" name="PlaceHolder 3"/>
           <p:cNvSpPr>
             <a:spLocks noGrp="1"/>
           </p:cNvSpPr>
@@ -196,7 +196,7 @@
         <p:txBody>
           <a:bodyPr/>
           <a:p>
-            <a:fld id="{6AA66F60-F737-45EB-9ED4-87A07141B785}" type="slidenum">
+            <a:fld id="{9B315701-02BE-4728-B3A1-F64AC585B1C3}" type="slidenum">
               <a:t>&lt;#&gt;</a:t>
             </a:fld>
           </a:p>
@@ -226,7 +226,7 @@
       </p:grpSpPr>
       <p:sp>
         <p:nvSpPr>
-          <p:cNvPr id="26" name="PlaceHolder 1"/>
+          <p:cNvPr id="27" name="PlaceHolder 1"/>
           <p:cNvSpPr>
             <a:spLocks noGrp="1"/>
           </p:cNvSpPr>
@@ -263,7 +263,7 @@
       </p:sp>
       <p:sp>
         <p:nvSpPr>
-          <p:cNvPr id="27" name="PlaceHolder 2"/>
+          <p:cNvPr id="28" name="PlaceHolder 2"/>
           <p:cNvSpPr>
             <a:spLocks noGrp="1"/>
           </p:cNvSpPr>
@@ -300,7 +300,7 @@
       </p:sp>
       <p:sp>
         <p:nvSpPr>
-          <p:cNvPr id="28" name="PlaceHolder 3"/>
+          <p:cNvPr id="29" name="PlaceHolder 3"/>
           <p:cNvSpPr>
             <a:spLocks noGrp="1"/>
           </p:cNvSpPr>
@@ -337,7 +337,7 @@
       </p:sp>
       <p:sp>
         <p:nvSpPr>
-          <p:cNvPr id="29" name="PlaceHolder 4"/>
+          <p:cNvPr id="30" name="PlaceHolder 4"/>
           <p:cNvSpPr>
             <a:spLocks noGrp="1"/>
           </p:cNvSpPr>
@@ -374,7 +374,7 @@
       </p:sp>
       <p:sp>
         <p:nvSpPr>
-          <p:cNvPr id="30" name="PlaceHolder 5"/>
+          <p:cNvPr id="31" name="PlaceHolder 5"/>
           <p:cNvSpPr>
             <a:spLocks noGrp="1"/>
           </p:cNvSpPr>
@@ -423,7 +423,7 @@
         <p:txBody>
           <a:bodyPr/>
           <a:p>
-            <a:fld id="{57E7585D-2C4A-4B47-9C52-AE9F8B1B06F3}" type="slidenum">
+            <a:fld id="{0213D7FF-C6A5-4FEE-8617-91D34D6E303A}" type="slidenum">
               <a:t>&lt;#&gt;</a:t>
             </a:fld>
           </a:p>
@@ -453,7 +453,7 @@
       </p:grpSpPr>
       <p:sp>
         <p:nvSpPr>
-          <p:cNvPr id="31" name="PlaceHolder 1"/>
+          <p:cNvPr id="32" name="PlaceHolder 1"/>
           <p:cNvSpPr>
             <a:spLocks noGrp="1"/>
           </p:cNvSpPr>
@@ -490,7 +490,7 @@
       </p:sp>
       <p:sp>
         <p:nvSpPr>
-          <p:cNvPr id="32" name="PlaceHolder 2"/>
+          <p:cNvPr id="33" name="PlaceHolder 2"/>
           <p:cNvSpPr>
             <a:spLocks noGrp="1"/>
           </p:cNvSpPr>
@@ -527,7 +527,7 @@
       </p:sp>
       <p:sp>
         <p:nvSpPr>
-          <p:cNvPr id="33" name="PlaceHolder 3"/>
+          <p:cNvPr id="34" name="PlaceHolder 3"/>
           <p:cNvSpPr>
             <a:spLocks noGrp="1"/>
           </p:cNvSpPr>
@@ -564,7 +564,7 @@
       </p:sp>
       <p:sp>
         <p:nvSpPr>
-          <p:cNvPr id="34" name="PlaceHolder 4"/>
+          <p:cNvPr id="35" name="PlaceHolder 4"/>
           <p:cNvSpPr>
             <a:spLocks noGrp="1"/>
           </p:cNvSpPr>
@@ -601,7 +601,7 @@
       </p:sp>
       <p:sp>
         <p:nvSpPr>
-          <p:cNvPr id="35" name="PlaceHolder 5"/>
+          <p:cNvPr id="36" name="PlaceHolder 5"/>
           <p:cNvSpPr>
             <a:spLocks noGrp="1"/>
           </p:cNvSpPr>
@@ -638,7 +638,7 @@
       </p:sp>
       <p:sp>
         <p:nvSpPr>
-          <p:cNvPr id="36" name="PlaceHolder 6"/>
+          <p:cNvPr id="37" name="PlaceHolder 6"/>
           <p:cNvSpPr>
             <a:spLocks noGrp="1"/>
           </p:cNvSpPr>
@@ -675,7 +675,7 @@
       </p:sp>
       <p:sp>
         <p:nvSpPr>
-          <p:cNvPr id="37" name="PlaceHolder 7"/>
+          <p:cNvPr id="38" name="PlaceHolder 7"/>
           <p:cNvSpPr>
             <a:spLocks noGrp="1"/>
           </p:cNvSpPr>
@@ -724,7 +724,7 @@
         <p:txBody>
           <a:bodyPr/>
           <a:p>
-            <a:fld id="{11E53754-5412-4EA0-8C00-6AEA0FB0F418}" type="slidenum">
+            <a:fld id="{C8870D45-7F54-443F-9288-F35C234DB7DF}" type="slidenum">
               <a:t>&lt;#&gt;</a:t>
             </a:fld>
           </a:p>
@@ -754,7 +754,7 @@
       </p:grpSpPr>
       <p:sp>
         <p:nvSpPr>
-          <p:cNvPr id="2" name="PlaceHolder 1"/>
+          <p:cNvPr id="3" name="PlaceHolder 1"/>
           <p:cNvSpPr>
             <a:spLocks noGrp="1"/>
           </p:cNvSpPr>
@@ -791,7 +791,7 @@
       </p:sp>
       <p:sp>
         <p:nvSpPr>
-          <p:cNvPr id="3" name="PlaceHolder 2"/>
+          <p:cNvPr id="4" name="PlaceHolder 2"/>
           <p:cNvSpPr>
             <a:spLocks noGrp="1"/>
           </p:cNvSpPr>
@@ -840,7 +840,7 @@
         <p:txBody>
           <a:bodyPr/>
           <a:p>
-            <a:fld id="{D5E1899E-4CFE-4519-9B36-FDC58915B3A3}" type="slidenum">
+            <a:fld id="{EC6EF16B-93B8-4D38-A248-7D97640028D1}" type="slidenum">
               <a:t>&lt;#&gt;</a:t>
             </a:fld>
           </a:p>
@@ -870,7 +870,7 @@
       </p:grpSpPr>
       <p:sp>
         <p:nvSpPr>
-          <p:cNvPr id="4" name="PlaceHolder 1"/>
+          <p:cNvPr id="5" name="PlaceHolder 1"/>
           <p:cNvSpPr>
             <a:spLocks noGrp="1"/>
           </p:cNvSpPr>
@@ -907,7 +907,7 @@
       </p:sp>
       <p:sp>
         <p:nvSpPr>
-          <p:cNvPr id="5" name="PlaceHolder 2"/>
+          <p:cNvPr id="6" name="PlaceHolder 2"/>
           <p:cNvSpPr>
             <a:spLocks noGrp="1"/>
           </p:cNvSpPr>
@@ -956,7 +956,7 @@
         <p:txBody>
           <a:bodyPr/>
           <a:p>
-            <a:fld id="{95C23B3E-A986-4D39-9BB8-1B9142F0AB0D}" type="slidenum">
+            <a:fld id="{D3C1FEF3-F904-4C0D-99B0-4E4FBD55B903}" type="slidenum">
               <a:t>&lt;#&gt;</a:t>
             </a:fld>
           </a:p>
@@ -986,7 +986,7 @@
       </p:grpSpPr>
       <p:sp>
         <p:nvSpPr>
-          <p:cNvPr id="6" name="PlaceHolder 1"/>
+          <p:cNvPr id="7" name="PlaceHolder 1"/>
           <p:cNvSpPr>
             <a:spLocks noGrp="1"/>
           </p:cNvSpPr>
@@ -1023,7 +1023,7 @@
       </p:sp>
       <p:sp>
         <p:nvSpPr>
-          <p:cNvPr id="7" name="PlaceHolder 2"/>
+          <p:cNvPr id="8" name="PlaceHolder 2"/>
           <p:cNvSpPr>
             <a:spLocks noGrp="1"/>
           </p:cNvSpPr>
@@ -1060,7 +1060,7 @@
       </p:sp>
       <p:sp>
         <p:nvSpPr>
-          <p:cNvPr id="8" name="PlaceHolder 3"/>
+          <p:cNvPr id="9" name="PlaceHolder 3"/>
           <p:cNvSpPr>
             <a:spLocks noGrp="1"/>
           </p:cNvSpPr>
@@ -1109,7 +1109,7 @@
         <p:txBody>
           <a:bodyPr/>
           <a:p>
-            <a:fld id="{33A5674D-F4E3-409F-910A-3D53616DF963}" type="slidenum">
+            <a:fld id="{C8989897-491F-4288-9526-FAC91D3DE6AD}" type="slidenum">
               <a:t>&lt;#&gt;</a:t>
             </a:fld>
           </a:p>
@@ -1139,7 +1139,7 @@
       </p:grpSpPr>
       <p:sp>
         <p:nvSpPr>
-          <p:cNvPr id="9" name="PlaceHolder 1"/>
+          <p:cNvPr id="10" name="PlaceHolder 1"/>
           <p:cNvSpPr>
             <a:spLocks noGrp="1"/>
           </p:cNvSpPr>
@@ -1188,7 +1188,7 @@
         <p:txBody>
           <a:bodyPr/>
           <a:p>
-            <a:fld id="{E82D5A17-B1A3-4DB9-9580-4CE457945565}" type="slidenum">
+            <a:fld id="{17DFD6BB-60CE-405D-A725-0F3C87C30DF2}" type="slidenum">
               <a:t>&lt;#&gt;</a:t>
             </a:fld>
           </a:p>
@@ -1218,7 +1218,7 @@
       </p:grpSpPr>
       <p:sp>
         <p:nvSpPr>
-          <p:cNvPr id="10" name="PlaceHolder 1"/>
+          <p:cNvPr id="11" name="PlaceHolder 1"/>
           <p:cNvSpPr>
             <a:spLocks noGrp="1"/>
           </p:cNvSpPr>
@@ -1267,7 +1267,7 @@
         <p:txBody>
           <a:bodyPr/>
           <a:p>
-            <a:fld id="{C1E1BB0D-8021-446E-898B-BB254BC6E3A0}" type="slidenum">
+            <a:fld id="{CAE952D1-C6AC-41B0-A083-0FDB28EAC5E8}" type="slidenum">
               <a:t>&lt;#&gt;</a:t>
             </a:fld>
           </a:p>
@@ -1297,7 +1297,7 @@
       </p:grpSpPr>
       <p:sp>
         <p:nvSpPr>
-          <p:cNvPr id="11" name="PlaceHolder 1"/>
+          <p:cNvPr id="12" name="PlaceHolder 1"/>
           <p:cNvSpPr>
             <a:spLocks noGrp="1"/>
           </p:cNvSpPr>
@@ -1334,7 +1334,7 @@
       </p:sp>
       <p:sp>
         <p:nvSpPr>
-          <p:cNvPr id="12" name="PlaceHolder 2"/>
+          <p:cNvPr id="13" name="PlaceHolder 2"/>
           <p:cNvSpPr>
             <a:spLocks noGrp="1"/>
           </p:cNvSpPr>
@@ -1371,7 +1371,7 @@
       </p:sp>
       <p:sp>
         <p:nvSpPr>
-          <p:cNvPr id="13" name="PlaceHolder 3"/>
+          <p:cNvPr id="14" name="PlaceHolder 3"/>
           <p:cNvSpPr>
             <a:spLocks noGrp="1"/>
           </p:cNvSpPr>
@@ -1408,7 +1408,7 @@
       </p:sp>
       <p:sp>
         <p:nvSpPr>
-          <p:cNvPr id="14" name="PlaceHolder 4"/>
+          <p:cNvPr id="15" name="PlaceHolder 4"/>
           <p:cNvSpPr>
             <a:spLocks noGrp="1"/>
           </p:cNvSpPr>
@@ -1457,7 +1457,7 @@
         <p:txBody>
           <a:bodyPr/>
           <a:p>
-            <a:fld id="{5F977E47-EC5E-43D5-8CC3-33BCD7043DDE}" type="slidenum">
+            <a:fld id="{8CFAB6DF-8C0E-4625-AE1F-C7E226ADF5B6}" type="slidenum">
               <a:t>&lt;#&gt;</a:t>
             </a:fld>
           </a:p>
@@ -1487,7 +1487,7 @@
       </p:grpSpPr>
       <p:sp>
         <p:nvSpPr>
-          <p:cNvPr id="15" name="PlaceHolder 1"/>
+          <p:cNvPr id="16" name="PlaceHolder 1"/>
           <p:cNvSpPr>
             <a:spLocks noGrp="1"/>
           </p:cNvSpPr>
@@ -1524,7 +1524,7 @@
       </p:sp>
       <p:sp>
         <p:nvSpPr>
-          <p:cNvPr id="16" name="PlaceHolder 2"/>
+          <p:cNvPr id="17" name="PlaceHolder 2"/>
           <p:cNvSpPr>
             <a:spLocks noGrp="1"/>
           </p:cNvSpPr>
@@ -1561,7 +1561,7 @@
       </p:sp>
       <p:sp>
         <p:nvSpPr>
-          <p:cNvPr id="17" name="PlaceHolder 3"/>
+          <p:cNvPr id="18" name="PlaceHolder 3"/>
           <p:cNvSpPr>
             <a:spLocks noGrp="1"/>
           </p:cNvSpPr>
@@ -1598,7 +1598,7 @@
       </p:sp>
       <p:sp>
         <p:nvSpPr>
-          <p:cNvPr id="18" name="PlaceHolder 4"/>
+          <p:cNvPr id="19" name="PlaceHolder 4"/>
           <p:cNvSpPr>
             <a:spLocks noGrp="1"/>
           </p:cNvSpPr>
@@ -1647,7 +1647,7 @@
         <p:txBody>
           <a:bodyPr/>
           <a:p>
-            <a:fld id="{09A92E11-A422-497D-9591-718765388148}" type="slidenum">
+            <a:fld id="{8388176A-23DB-4F30-A52B-9910571D1F8C}" type="slidenum">
               <a:t>&lt;#&gt;</a:t>
             </a:fld>
           </a:p>
@@ -1677,7 +1677,7 @@
       </p:grpSpPr>
       <p:sp>
         <p:nvSpPr>
-          <p:cNvPr id="19" name="PlaceHolder 1"/>
+          <p:cNvPr id="20" name="PlaceHolder 1"/>
           <p:cNvSpPr>
             <a:spLocks noGrp="1"/>
           </p:cNvSpPr>
@@ -1714,7 +1714,7 @@
       </p:sp>
       <p:sp>
         <p:nvSpPr>
-          <p:cNvPr id="20" name="PlaceHolder 2"/>
+          <p:cNvPr id="21" name="PlaceHolder 2"/>
           <p:cNvSpPr>
             <a:spLocks noGrp="1"/>
           </p:cNvSpPr>
@@ -1751,7 +1751,7 @@
       </p:sp>
       <p:sp>
         <p:nvSpPr>
-          <p:cNvPr id="21" name="PlaceHolder 3"/>
+          <p:cNvPr id="22" name="PlaceHolder 3"/>
           <p:cNvSpPr>
             <a:spLocks noGrp="1"/>
           </p:cNvSpPr>
@@ -1788,7 +1788,7 @@
       </p:sp>
       <p:sp>
         <p:nvSpPr>
-          <p:cNvPr id="22" name="PlaceHolder 4"/>
+          <p:cNvPr id="23" name="PlaceHolder 4"/>
           <p:cNvSpPr>
             <a:spLocks noGrp="1"/>
           </p:cNvSpPr>
@@ -1837,7 +1837,7 @@
         <p:txBody>
           <a:bodyPr/>
           <a:p>
-            <a:fld id="{80FDE48A-11E9-40D3-B912-543124D7B08E}" type="slidenum">
+            <a:fld id="{B964BCBF-AD41-40E0-834C-00A8786CE62E}" type="slidenum">
               <a:t>&lt;#&gt;</a:t>
             </a:fld>
           </a:p>
@@ -1973,7 +1973,7 @@
                 <a:tab algn="l" pos="0"/>
               </a:tabLst>
             </a:pPr>
-            <a:fld id="{01DB9BE2-6754-4656-99D6-396EE0CA4037}" type="slidenum">
+            <a:fld id="{61C05823-885B-4ABC-90AD-5BC07644389B}" type="slidenum">
               <a:rPr b="0" lang="en" sz="1000" spc="-1" strike="noStrike">
                 <a:solidFill>
                   <a:srgbClr val="595959"/>
@@ -1985,6 +1985,231 @@
             </a:fld>
             <a:endParaRPr b="0" lang="en-US" sz="1000" spc="-1" strike="noStrike">
               <a:latin typeface="Times New Roman"/>
+            </a:endParaRPr>
+          </a:p>
+        </p:txBody>
+      </p:sp>
+      <p:sp>
+        <p:nvSpPr>
+          <p:cNvPr id="2" name="PlaceHolder 3"/>
+          <p:cNvSpPr>
+            <a:spLocks noGrp="1"/>
+          </p:cNvSpPr>
+          <p:nvPr>
+            <p:ph type="body"/>
+          </p:nvPr>
+        </p:nvSpPr>
+        <p:spPr>
+          <a:xfrm>
+            <a:off x="457200" y="1203480"/>
+            <a:ext cx="8229240" cy="2982960"/>
+          </a:xfrm>
+          <a:prstGeom prst="rect">
+            <a:avLst/>
+          </a:prstGeom>
+          <a:noFill/>
+          <a:ln w="0">
+            <a:noFill/>
+          </a:ln>
+        </p:spPr>
+        <p:txBody>
+          <a:bodyPr lIns="0" rIns="0" tIns="0" bIns="0" anchor="t">
+            <a:normAutofit/>
+          </a:bodyPr>
+          <a:p>
+            <a:pPr marL="432000" indent="-324000">
+              <a:spcBef>
+                <a:spcPts val="1417"/>
+              </a:spcBef>
+              <a:buClr>
+                <a:srgbClr val="000000"/>
+              </a:buClr>
+              <a:buSzPct val="45000"/>
+              <a:buFont typeface="Wingdings" charset="2"/>
+              <a:buChar char=""/>
+            </a:pPr>
+            <a:r>
+              <a:rPr b="0" lang="en-US" sz="1400" spc="-1" strike="noStrike">
+                <a:solidFill>
+                  <a:srgbClr val="000000"/>
+                </a:solidFill>
+                <a:latin typeface="Arial"/>
+              </a:rPr>
+              <a:t>Click to edit the outline text format</a:t>
+            </a:r>
+            <a:endParaRPr b="0" lang="en-US" sz="1400" spc="-1" strike="noStrike">
+              <a:solidFill>
+                <a:srgbClr val="000000"/>
+              </a:solidFill>
+              <a:latin typeface="Arial"/>
+            </a:endParaRPr>
+          </a:p>
+          <a:p>
+            <a:pPr lvl="1" marL="864000" indent="-324000">
+              <a:spcBef>
+                <a:spcPts val="1134"/>
+              </a:spcBef>
+              <a:buClr>
+                <a:srgbClr val="000000"/>
+              </a:buClr>
+              <a:buSzPct val="75000"/>
+              <a:buFont typeface="Symbol" charset="2"/>
+              <a:buChar char=""/>
+            </a:pPr>
+            <a:r>
+              <a:rPr b="0" lang="en-US" sz="1400" spc="-1" strike="noStrike">
+                <a:solidFill>
+                  <a:srgbClr val="000000"/>
+                </a:solidFill>
+                <a:latin typeface="Arial"/>
+              </a:rPr>
+              <a:t>Second Outline Level</a:t>
+            </a:r>
+            <a:endParaRPr b="0" lang="en-US" sz="1400" spc="-1" strike="noStrike">
+              <a:solidFill>
+                <a:srgbClr val="000000"/>
+              </a:solidFill>
+              <a:latin typeface="Arial"/>
+            </a:endParaRPr>
+          </a:p>
+          <a:p>
+            <a:pPr lvl="2" marL="1296000" indent="-288000">
+              <a:spcBef>
+                <a:spcPts val="850"/>
+              </a:spcBef>
+              <a:buClr>
+                <a:srgbClr val="000000"/>
+              </a:buClr>
+              <a:buSzPct val="45000"/>
+              <a:buFont typeface="Wingdings" charset="2"/>
+              <a:buChar char=""/>
+            </a:pPr>
+            <a:r>
+              <a:rPr b="0" lang="en-US" sz="1400" spc="-1" strike="noStrike">
+                <a:solidFill>
+                  <a:srgbClr val="000000"/>
+                </a:solidFill>
+                <a:latin typeface="Arial"/>
+              </a:rPr>
+              <a:t>Third Outline Level</a:t>
+            </a:r>
+            <a:endParaRPr b="0" lang="en-US" sz="1400" spc="-1" strike="noStrike">
+              <a:solidFill>
+                <a:srgbClr val="000000"/>
+              </a:solidFill>
+              <a:latin typeface="Arial"/>
+            </a:endParaRPr>
+          </a:p>
+          <a:p>
+            <a:pPr lvl="3" marL="1728000" indent="-216000">
+              <a:spcBef>
+                <a:spcPts val="567"/>
+              </a:spcBef>
+              <a:buClr>
+                <a:srgbClr val="000000"/>
+              </a:buClr>
+              <a:buSzPct val="75000"/>
+              <a:buFont typeface="Symbol" charset="2"/>
+              <a:buChar char=""/>
+            </a:pPr>
+            <a:r>
+              <a:rPr b="0" lang="en-US" sz="1400" spc="-1" strike="noStrike">
+                <a:solidFill>
+                  <a:srgbClr val="000000"/>
+                </a:solidFill>
+                <a:latin typeface="Arial"/>
+              </a:rPr>
+              <a:t>Fourth Outline Level</a:t>
+            </a:r>
+            <a:endParaRPr b="0" lang="en-US" sz="1400" spc="-1" strike="noStrike">
+              <a:solidFill>
+                <a:srgbClr val="000000"/>
+              </a:solidFill>
+              <a:latin typeface="Arial"/>
+            </a:endParaRPr>
+          </a:p>
+          <a:p>
+            <a:pPr lvl="4" marL="2160000" indent="-216000">
+              <a:spcBef>
+                <a:spcPts val="283"/>
+              </a:spcBef>
+              <a:buClr>
+                <a:srgbClr val="000000"/>
+              </a:buClr>
+              <a:buSzPct val="45000"/>
+              <a:buFont typeface="Wingdings" charset="2"/>
+              <a:buChar char=""/>
+            </a:pPr>
+            <a:r>
+              <a:rPr b="0" lang="en-US" sz="2000" spc="-1" strike="noStrike">
+                <a:solidFill>
+                  <a:srgbClr val="000000"/>
+                </a:solidFill>
+                <a:latin typeface="Arial"/>
+              </a:rPr>
+              <a:t>Fifth Outline Level</a:t>
+            </a:r>
+            <a:endParaRPr b="0" lang="en-US" sz="2000" spc="-1" strike="noStrike">
+              <a:solidFill>
+                <a:srgbClr val="000000"/>
+              </a:solidFill>
+              <a:latin typeface="Arial"/>
+            </a:endParaRPr>
+          </a:p>
+          <a:p>
+            <a:pPr lvl="5" marL="2592000" indent="-216000">
+              <a:spcBef>
+                <a:spcPts val="283"/>
+              </a:spcBef>
+              <a:buClr>
+                <a:srgbClr val="000000"/>
+              </a:buClr>
+              <a:buSzPct val="45000"/>
+              <a:buFont typeface="Wingdings" charset="2"/>
+              <a:buChar char=""/>
+            </a:pPr>
+            <a:r>
+              <a:rPr b="0" lang="en-US" sz="2000" spc="-1" strike="noStrike">
+                <a:solidFill>
+                  <a:srgbClr val="000000"/>
+                </a:solidFill>
+                <a:latin typeface="Arial"/>
+              </a:rPr>
+              <a:t>Sixth Outline Level</a:t>
+            </a:r>
+            <a:endParaRPr b="0" lang="en-US" sz="2000" spc="-1" strike="noStrike">
+              <a:solidFill>
+                <a:srgbClr val="000000"/>
+              </a:solidFill>
+              <a:latin typeface="Arial"/>
+            </a:endParaRPr>
+          </a:p>
+          <a:p>
+            <a:pPr lvl="6" marL="3024000" indent="-216000">
+              <a:spcBef>
+                <a:spcPts val="283"/>
+              </a:spcBef>
+              <a:buClr>
+                <a:srgbClr val="000000"/>
+              </a:buClr>
+              <a:buSzPct val="45000"/>
+              <a:buFont typeface="Wingdings" charset="2"/>
+              <a:buChar char=""/>
+            </a:pPr>
+            <a:r>
+              <a:rPr b="0" lang="en-US" sz="2000" spc="-1" strike="noStrike">
+                <a:solidFill>
+                  <a:srgbClr val="000000"/>
+                </a:solidFill>
+                <a:latin typeface="Arial"/>
+              </a:rPr>
+              <a:t>Seventh Outline Level</a:t>
+            </a:r>
+            <a:endParaRPr b="0" lang="en-US" sz="2000" spc="-1" strike="noStrike">
+              <a:solidFill>
+                <a:srgbClr val="000000"/>
+              </a:solidFill>
+              <a:latin typeface="Arial"/>
             </a:endParaRPr>
           </a:p>
         </p:txBody>
@@ -2028,7 +2253,7 @@
       </p:grpSpPr>
       <p:sp>
         <p:nvSpPr>
-          <p:cNvPr id="38" name="Google Shape;54;p13"/>
+          <p:cNvPr id="39" name="Google Shape;54;p13"/>
           <p:cNvSpPr/>
           <p:nvPr/>
         </p:nvSpPr>
@@ -2085,7 +2310,7 @@
       </p:sp>
       <p:sp>
         <p:nvSpPr>
-          <p:cNvPr id="39" name="Google Shape;55;p13"/>
+          <p:cNvPr id="40" name="Google Shape;55;p13"/>
           <p:cNvSpPr/>
           <p:nvPr/>
         </p:nvSpPr>
@@ -2142,7 +2367,7 @@
       </p:sp>
       <p:sp>
         <p:nvSpPr>
-          <p:cNvPr id="40" name="Google Shape;56;p13"/>
+          <p:cNvPr id="41" name="Google Shape;56;p13"/>
           <p:cNvSpPr/>
           <p:nvPr/>
         </p:nvSpPr>
@@ -2199,7 +2424,7 @@
       </p:sp>
       <p:sp>
         <p:nvSpPr>
-          <p:cNvPr id="41" name="Google Shape;57;p13"/>
+          <p:cNvPr id="42" name="Google Shape;57;p13"/>
           <p:cNvSpPr/>
           <p:nvPr/>
         </p:nvSpPr>
@@ -2256,7 +2481,7 @@
       </p:sp>
       <p:sp>
         <p:nvSpPr>
-          <p:cNvPr id="42" name="Google Shape;58;p13"/>
+          <p:cNvPr id="43" name="Google Shape;58;p13"/>
           <p:cNvSpPr/>
           <p:nvPr/>
         </p:nvSpPr>
@@ -2313,7 +2538,7 @@
       </p:sp>
       <p:sp>
         <p:nvSpPr>
-          <p:cNvPr id="43" name="Google Shape;57;p 1"/>
+          <p:cNvPr id="44" name="Google Shape;57;p 1"/>
           <p:cNvSpPr/>
           <p:nvPr/>
         </p:nvSpPr>
@@ -2390,7 +2615,7 @@
       </p:sp>
       <p:sp>
         <p:nvSpPr>
-          <p:cNvPr id="44" name="Google Shape;54;p 1"/>
+          <p:cNvPr id="45" name="Google Shape;54;p 1"/>
           <p:cNvSpPr/>
           <p:nvPr/>
         </p:nvSpPr>
@@ -2457,7 +2682,7 @@
       </p:sp>
       <p:sp>
         <p:nvSpPr>
-          <p:cNvPr id="45" name="Google Shape;54;p 2"/>
+          <p:cNvPr id="46" name="Google Shape;54;p 2"/>
           <p:cNvSpPr/>
           <p:nvPr/>
         </p:nvSpPr>
@@ -2654,7 +2879,7 @@
       </p:sp>
       <p:sp>
         <p:nvSpPr>
-          <p:cNvPr id="46" name="Google Shape;55;p 1"/>
+          <p:cNvPr id="47" name="Google Shape;55;p 1"/>
           <p:cNvSpPr/>
           <p:nvPr/>
         </p:nvSpPr>
@@ -2711,28 +2936,6 @@
       </p:sp>
       <p:cxnSp>
         <p:nvCxnSpPr>
-          <p:cNvPr id="47" name=""/>
-          <p:cNvCxnSpPr/>
-          <p:nvPr/>
-        </p:nvCxnSpPr>
-        <p:spPr>
-          <a:xfrm>
-            <a:off x="0" y="0"/>
-            <a:ext cx="360" cy="360"/>
-          </a:xfrm>
-          <a:prstGeom prst="line">
-            <a:avLst/>
-          </a:prstGeom>
-          <a:ln w="0">
-            <a:solidFill>
-              <a:srgbClr val="3465a4"/>
-            </a:solidFill>
-            <a:tailEnd len="med" type="triangle" w="med"/>
-          </a:ln>
-        </p:spPr>
-      </p:cxnSp>
-      <p:cxnSp>
-        <p:nvCxnSpPr>
           <p:cNvPr id="48" name=""/>
           <p:cNvCxnSpPr/>
           <p:nvPr/>
@@ -2910,6 +3113,28 @@
       <p:cxnSp>
         <p:nvCxnSpPr>
           <p:cNvPr id="56" name=""/>
+          <p:cNvCxnSpPr/>
+          <p:nvPr/>
+        </p:nvCxnSpPr>
+        <p:spPr>
+          <a:xfrm>
+            <a:off x="0" y="0"/>
+            <a:ext cx="360" cy="360"/>
+          </a:xfrm>
+          <a:prstGeom prst="line">
+            <a:avLst/>
+          </a:prstGeom>
+          <a:ln w="0">
+            <a:solidFill>
+              <a:srgbClr val="3465a4"/>
+            </a:solidFill>
+            <a:tailEnd len="med" type="triangle" w="med"/>
+          </a:ln>
+        </p:spPr>
+      </p:cxnSp>
+      <p:cxnSp>
+        <p:nvCxnSpPr>
+          <p:cNvPr id="57" name=""/>
           <p:cNvCxnSpPr/>
           <p:nvPr/>
         </p:nvCxnSpPr>

</xml_diff>